<commit_message>
Make minor changes to presentation, documentation and README.md
</commit_message>
<xml_diff>
--- a/doc/Presentation.pptx
+++ b/doc/Presentation.pptx
@@ -13807,13 +13807,13 @@
   <p:clrMapOvr>
     <a:masterClrMapping/>
   </p:clrMapOvr>
-  <mc:AlternateContent xmlns:mc="http://schemas.openxmlformats.org/markup-compatibility/2006">
-    <mc:Choice xmlns:p14="http://schemas.microsoft.com/office/powerpoint/2010/main" Requires="p14">
+  <mc:AlternateContent xmlns:mc="http://schemas.openxmlformats.org/markup-compatibility/2006" xmlns:p14="http://schemas.microsoft.com/office/powerpoint/2010/main">
+    <mc:Choice Requires="p14">
       <p:transition spd="med" p14:dur="700">
         <p:fade/>
       </p:transition>
     </mc:Choice>
-    <mc:Fallback>
+    <mc:Fallback xmlns="">
       <p:transition spd="med">
         <p:fade/>
       </p:transition>
@@ -17564,13 +17564,13 @@
   <p:clrMapOvr>
     <a:masterClrMapping/>
   </p:clrMapOvr>
-  <mc:AlternateContent xmlns:mc="http://schemas.openxmlformats.org/markup-compatibility/2006">
-    <mc:Choice xmlns:p14="http://schemas.microsoft.com/office/powerpoint/2010/main" Requires="p14">
+  <mc:AlternateContent xmlns:mc="http://schemas.openxmlformats.org/markup-compatibility/2006" xmlns:p14="http://schemas.microsoft.com/office/powerpoint/2010/main">
+    <mc:Choice Requires="p14">
       <p:transition spd="med" p14:dur="700">
         <p:fade/>
       </p:transition>
     </mc:Choice>
-    <mc:Fallback>
+    <mc:Fallback xmlns="">
       <p:transition spd="med">
         <p:fade/>
       </p:transition>
@@ -19411,13 +19411,13 @@
   <p:clrMapOvr>
     <a:masterClrMapping/>
   </p:clrMapOvr>
-  <mc:AlternateContent xmlns:mc="http://schemas.openxmlformats.org/markup-compatibility/2006">
-    <mc:Choice xmlns:p14="http://schemas.microsoft.com/office/powerpoint/2010/main" Requires="p14">
+  <mc:AlternateContent xmlns:mc="http://schemas.openxmlformats.org/markup-compatibility/2006" xmlns:p14="http://schemas.microsoft.com/office/powerpoint/2010/main">
+    <mc:Choice Requires="p14">
       <p:transition spd="med" p14:dur="700">
         <p:fade/>
       </p:transition>
     </mc:Choice>
-    <mc:Fallback>
+    <mc:Fallback xmlns="">
       <p:transition spd="med">
         <p:fade/>
       </p:transition>
@@ -22506,13 +22506,13 @@
   <p:clrMapOvr>
     <a:masterClrMapping/>
   </p:clrMapOvr>
-  <mc:AlternateContent xmlns:mc="http://schemas.openxmlformats.org/markup-compatibility/2006">
-    <mc:Choice xmlns:p14="http://schemas.microsoft.com/office/powerpoint/2010/main" Requires="p14">
+  <mc:AlternateContent xmlns:mc="http://schemas.openxmlformats.org/markup-compatibility/2006" xmlns:p14="http://schemas.microsoft.com/office/powerpoint/2010/main">
+    <mc:Choice Requires="p14">
       <p:transition spd="med" p14:dur="700">
         <p:fade/>
       </p:transition>
     </mc:Choice>
-    <mc:Fallback>
+    <mc:Fallback xmlns="">
       <p:transition spd="med">
         <p:fade/>
       </p:transition>
@@ -24584,13 +24584,13 @@
   <p:clrMapOvr>
     <a:masterClrMapping/>
   </p:clrMapOvr>
-  <mc:AlternateContent xmlns:mc="http://schemas.openxmlformats.org/markup-compatibility/2006">
-    <mc:Choice xmlns:p14="http://schemas.microsoft.com/office/powerpoint/2010/main" Requires="p14">
+  <mc:AlternateContent xmlns:mc="http://schemas.openxmlformats.org/markup-compatibility/2006" xmlns:p14="http://schemas.microsoft.com/office/powerpoint/2010/main">
+    <mc:Choice Requires="p14">
       <p:transition spd="med" p14:dur="700">
         <p:fade/>
       </p:transition>
     </mc:Choice>
-    <mc:Fallback>
+    <mc:Fallback xmlns="">
       <p:transition spd="med">
         <p:fade/>
       </p:transition>
@@ -30569,13 +30569,13 @@
   <p:clrMapOvr>
     <a:masterClrMapping/>
   </p:clrMapOvr>
-  <mc:AlternateContent xmlns:mc="http://schemas.openxmlformats.org/markup-compatibility/2006">
-    <mc:Choice xmlns:p14="http://schemas.microsoft.com/office/powerpoint/2010/main" Requires="p14">
+  <mc:AlternateContent xmlns:mc="http://schemas.openxmlformats.org/markup-compatibility/2006" xmlns:p14="http://schemas.microsoft.com/office/powerpoint/2010/main">
+    <mc:Choice Requires="p14">
       <p:transition spd="med" p14:dur="700">
         <p:fade/>
       </p:transition>
     </mc:Choice>
-    <mc:Fallback>
+    <mc:Fallback xmlns="">
       <p:transition spd="med">
         <p:fade/>
       </p:transition>
@@ -30606,13 +30606,13 @@
   <p:clrMapOvr>
     <a:masterClrMapping/>
   </p:clrMapOvr>
-  <mc:AlternateContent xmlns:mc="http://schemas.openxmlformats.org/markup-compatibility/2006">
-    <mc:Choice xmlns:p14="http://schemas.microsoft.com/office/powerpoint/2010/main" Requires="p14">
+  <mc:AlternateContent xmlns:mc="http://schemas.openxmlformats.org/markup-compatibility/2006" xmlns:p14="http://schemas.microsoft.com/office/powerpoint/2010/main">
+    <mc:Choice Requires="p14">
       <p:transition spd="med" p14:dur="700">
         <p:fade/>
       </p:transition>
     </mc:Choice>
-    <mc:Fallback>
+    <mc:Fallback xmlns="">
       <p:transition spd="med">
         <p:fade/>
       </p:transition>
@@ -31167,13 +31167,13 @@
     <p:sldLayoutId id="2147483669" r:id="rId6"/>
     <p:sldLayoutId id="2147483677" r:id="rId7"/>
   </p:sldLayoutIdLst>
-  <mc:AlternateContent xmlns:mc="http://schemas.openxmlformats.org/markup-compatibility/2006">
-    <mc:Choice xmlns:p14="http://schemas.microsoft.com/office/powerpoint/2010/main" Requires="p14">
+  <mc:AlternateContent xmlns:mc="http://schemas.openxmlformats.org/markup-compatibility/2006" xmlns:p14="http://schemas.microsoft.com/office/powerpoint/2010/main">
+    <mc:Choice Requires="p14">
       <p:transition spd="med" p14:dur="700">
         <p:fade/>
       </p:transition>
     </mc:Choice>
-    <mc:Fallback>
+    <mc:Fallback xmlns="">
       <p:transition spd="med">
         <p:fade/>
       </p:transition>
@@ -32014,13 +32014,13 @@
   <p:clrMapOvr>
     <a:masterClrMapping/>
   </p:clrMapOvr>
-  <mc:AlternateContent xmlns:mc="http://schemas.openxmlformats.org/markup-compatibility/2006">
-    <mc:Choice xmlns:p14="http://schemas.microsoft.com/office/powerpoint/2010/main" Requires="p14">
+  <mc:AlternateContent xmlns:mc="http://schemas.openxmlformats.org/markup-compatibility/2006" xmlns:p14="http://schemas.microsoft.com/office/powerpoint/2010/main">
+    <mc:Choice Requires="p14">
       <p:transition spd="med" p14:dur="700">
         <p:fade/>
       </p:transition>
     </mc:Choice>
-    <mc:Fallback>
+    <mc:Fallback xmlns="">
       <p:transition spd="med">
         <p:fade/>
       </p:transition>
@@ -33693,13 +33693,13 @@
   <p:clrMapOvr>
     <a:masterClrMapping/>
   </p:clrMapOvr>
-  <mc:AlternateContent xmlns:mc="http://schemas.openxmlformats.org/markup-compatibility/2006">
-    <mc:Choice xmlns:p14="http://schemas.microsoft.com/office/powerpoint/2010/main" Requires="p14">
+  <mc:AlternateContent xmlns:mc="http://schemas.openxmlformats.org/markup-compatibility/2006" xmlns:p14="http://schemas.microsoft.com/office/powerpoint/2010/main">
+    <mc:Choice Requires="p14">
       <p:transition spd="med" p14:dur="700">
         <p:fade/>
       </p:transition>
     </mc:Choice>
-    <mc:Fallback>
+    <mc:Fallback xmlns="">
       <p:transition spd="med">
         <p:fade/>
       </p:transition>
@@ -33925,13 +33925,13 @@
   <p:clrMapOvr>
     <a:masterClrMapping/>
   </p:clrMapOvr>
-  <mc:AlternateContent xmlns:mc="http://schemas.openxmlformats.org/markup-compatibility/2006">
-    <mc:Choice xmlns:p14="http://schemas.microsoft.com/office/powerpoint/2010/main" Requires="p14">
+  <mc:AlternateContent xmlns:mc="http://schemas.openxmlformats.org/markup-compatibility/2006" xmlns:p14="http://schemas.microsoft.com/office/powerpoint/2010/main">
+    <mc:Choice Requires="p14">
       <p:transition spd="med" p14:dur="700">
         <p:fade/>
       </p:transition>
     </mc:Choice>
-    <mc:Fallback>
+    <mc:Fallback xmlns="">
       <p:transition spd="med">
         <p:fade/>
       </p:transition>
@@ -35924,13 +35924,13 @@
   <p:clrMapOvr>
     <a:masterClrMapping/>
   </p:clrMapOvr>
-  <mc:AlternateContent xmlns:mc="http://schemas.openxmlformats.org/markup-compatibility/2006">
-    <mc:Choice xmlns:p14="http://schemas.microsoft.com/office/powerpoint/2010/main" Requires="p14">
+  <mc:AlternateContent xmlns:mc="http://schemas.openxmlformats.org/markup-compatibility/2006" xmlns:p14="http://schemas.microsoft.com/office/powerpoint/2010/main">
+    <mc:Choice Requires="p14">
       <p:transition spd="med" p14:dur="700">
         <p:fade/>
       </p:transition>
     </mc:Choice>
-    <mc:Fallback>
+    <mc:Fallback xmlns="">
       <p:transition spd="med">
         <p:fade/>
       </p:transition>
@@ -36372,53 +36372,6 @@
       </p:grpSp>
       <p:pic>
         <p:nvPicPr>
-          <p:cNvPr id="2094" name="Picture 46" descr="GitLab Pages examples / doxygen · GitLab">
-            <a:extLst>
-              <a:ext uri="{FF2B5EF4-FFF2-40B4-BE49-F238E27FC236}">
-                <a16:creationId xmlns:a16="http://schemas.microsoft.com/office/drawing/2014/main" id="{E52D85D0-EA79-C583-725F-1AAD11D8D91C}"/>
-              </a:ext>
-            </a:extLst>
-          </p:cNvPr>
-          <p:cNvPicPr>
-            <a:picLocks noChangeAspect="1" noChangeArrowheads="1"/>
-          </p:cNvPicPr>
-          <p:nvPr/>
-        </p:nvPicPr>
-        <p:blipFill>
-          <a:blip r:embed="rId11">
-            <a:extLst>
-              <a:ext uri="{28A0092B-C50C-407E-A947-70E740481C1C}">
-                <a14:useLocalDpi xmlns:a14="http://schemas.microsoft.com/office/drawing/2010/main" val="0"/>
-              </a:ext>
-            </a:extLst>
-          </a:blip>
-          <a:srcRect/>
-          <a:stretch>
-            <a:fillRect/>
-          </a:stretch>
-        </p:blipFill>
-        <p:spPr bwMode="auto">
-          <a:xfrm>
-            <a:off x="1819964" y="3032150"/>
-            <a:ext cx="1208297" cy="1208297"/>
-          </a:xfrm>
-          <a:prstGeom prst="rect">
-            <a:avLst/>
-          </a:prstGeom>
-          <a:noFill/>
-          <a:extLst>
-            <a:ext uri="{909E8E84-426E-40DD-AFC4-6F175D3DCCD1}">
-              <a14:hiddenFill xmlns:a14="http://schemas.microsoft.com/office/drawing/2010/main">
-                <a:solidFill>
-                  <a:srgbClr val="FFFFFF"/>
-                </a:solidFill>
-              </a14:hiddenFill>
-            </a:ext>
-          </a:extLst>
-        </p:spPr>
-      </p:pic>
-      <p:pic>
-        <p:nvPicPr>
           <p:cNvPr id="2096" name="Picture 48" descr="Figma's new icon | Figma, Branding design, Retail logo">
             <a:extLst>
               <a:ext uri="{FF2B5EF4-FFF2-40B4-BE49-F238E27FC236}">
@@ -36432,7 +36385,7 @@
           <p:nvPr/>
         </p:nvPicPr>
         <p:blipFill>
-          <a:blip r:embed="rId12">
+          <a:blip r:embed="rId11">
             <a:extLst>
               <a:ext uri="{28A0092B-C50C-407E-A947-70E740481C1C}">
                 <a14:useLocalDpi xmlns:a14="http://schemas.microsoft.com/office/drawing/2010/main" val="0"/>
@@ -36464,18 +36417,85 @@
           </a:extLst>
         </p:spPr>
       </p:pic>
+      <p:pic>
+        <p:nvPicPr>
+          <p:cNvPr id="1028" name="Picture 4" descr="Microsoft Word: Edit Documents – Приложения в Google Play">
+            <a:extLst>
+              <a:ext uri="{FF2B5EF4-FFF2-40B4-BE49-F238E27FC236}">
+                <a16:creationId xmlns:a16="http://schemas.microsoft.com/office/drawing/2014/main" id="{842C4795-B5D2-9EB0-1554-0E55BC635171}"/>
+              </a:ext>
+            </a:extLst>
+          </p:cNvPr>
+          <p:cNvPicPr>
+            <a:picLocks noChangeAspect="1" noChangeArrowheads="1"/>
+          </p:cNvPicPr>
+          <p:nvPr/>
+        </p:nvPicPr>
+        <p:blipFill>
+          <a:blip r:embed="rId12">
+            <a:extLst>
+              <a:ext uri="{BEBA8EAE-BF5A-486C-A8C5-ECC9F3942E4B}">
+                <a14:imgProps xmlns:a14="http://schemas.microsoft.com/office/drawing/2010/main">
+                  <a14:imgLayer r:embed="rId13">
+                    <a14:imgEffect>
+                      <a14:backgroundRemoval t="10000" b="90000" l="10000" r="90000">
+                        <a14:foregroundMark x1="17773" y1="42578" x2="41016" y2="43359"/>
+                        <a14:foregroundMark x1="39844" y1="41797" x2="31836" y2="47266"/>
+                        <a14:foregroundMark x1="31836" y1="47266" x2="36328" y2="60742"/>
+                        <a14:foregroundMark x1="40234" y1="49414" x2="40234" y2="49414"/>
+                        <a14:foregroundMark x1="40234" y1="48828" x2="16992" y2="40820"/>
+                        <a14:foregroundMark x1="18359" y1="43945" x2="19922" y2="47266"/>
+                        <a14:foregroundMark x1="20703" y1="53906" x2="25391" y2="53906"/>
+                        <a14:foregroundMark x1="24609" y1="56055" x2="22852" y2="56055"/>
+                        <a14:foregroundMark x1="26758" y1="50195" x2="26758" y2="50195"/>
+                        <a14:foregroundMark x1="26758" y1="50195" x2="26758" y2="50195"/>
+                      </a14:backgroundRemoval>
+                    </a14:imgEffect>
+                  </a14:imgLayer>
+                </a14:imgProps>
+              </a:ext>
+              <a:ext uri="{28A0092B-C50C-407E-A947-70E740481C1C}">
+                <a14:useLocalDpi xmlns:a14="http://schemas.microsoft.com/office/drawing/2010/main" val="0"/>
+              </a:ext>
+            </a:extLst>
+          </a:blip>
+          <a:srcRect/>
+          <a:stretch>
+            <a:fillRect/>
+          </a:stretch>
+        </p:blipFill>
+        <p:spPr bwMode="auto">
+          <a:xfrm>
+            <a:off x="1819964" y="2974475"/>
+            <a:ext cx="1482947" cy="1482947"/>
+          </a:xfrm>
+          <a:prstGeom prst="rect">
+            <a:avLst/>
+          </a:prstGeom>
+          <a:noFill/>
+          <a:extLst>
+            <a:ext uri="{909E8E84-426E-40DD-AFC4-6F175D3DCCD1}">
+              <a14:hiddenFill xmlns:a14="http://schemas.microsoft.com/office/drawing/2010/main">
+                <a:solidFill>
+                  <a:srgbClr val="FFFFFF"/>
+                </a:solidFill>
+              </a14:hiddenFill>
+            </a:ext>
+          </a:extLst>
+        </p:spPr>
+      </p:pic>
     </p:spTree>
   </p:cSld>
   <p:clrMapOvr>
     <a:masterClrMapping/>
   </p:clrMapOvr>
-  <mc:AlternateContent xmlns:mc="http://schemas.openxmlformats.org/markup-compatibility/2006">
-    <mc:Choice xmlns:p14="http://schemas.microsoft.com/office/powerpoint/2010/main" Requires="p14">
+  <mc:AlternateContent xmlns:mc="http://schemas.openxmlformats.org/markup-compatibility/2006" xmlns:p14="http://schemas.microsoft.com/office/powerpoint/2010/main">
+    <mc:Choice Requires="p14">
       <p:transition spd="med" p14:dur="700">
         <p:fade/>
       </p:transition>
     </mc:Choice>
-    <mc:Fallback>
+    <mc:Fallback xmlns="">
       <p:transition spd="med">
         <p:fade/>
       </p:transition>
@@ -36548,13 +36568,13 @@
   <p:clrMapOvr>
     <a:masterClrMapping/>
   </p:clrMapOvr>
-  <mc:AlternateContent xmlns:mc="http://schemas.openxmlformats.org/markup-compatibility/2006">
-    <mc:Choice xmlns:p14="http://schemas.microsoft.com/office/powerpoint/2010/main" Requires="p14">
+  <mc:AlternateContent xmlns:mc="http://schemas.openxmlformats.org/markup-compatibility/2006" xmlns:p14="http://schemas.microsoft.com/office/powerpoint/2010/main">
+    <mc:Choice Requires="p14">
       <p:transition spd="med" p14:dur="700">
         <p:fade/>
       </p:transition>
     </mc:Choice>
-    <mc:Fallback>
+    <mc:Fallback xmlns="">
       <p:transition spd="med">
         <p:fade/>
       </p:transition>

</xml_diff>